<commit_message>
Upgraded to .NET 9 and C# 13.0
</commit_message>
<xml_diff>
--- a/Documentation/NQueen Presentation.pptx
+++ b/Documentation/NQueen Presentation.pptx
@@ -234,7 +234,7 @@
           </a:lstStyle>
           <a:p>
             <a:fld id="{22356391-CFA0-1544-8425-9183CAE42ACA}" type="datetimeFigureOut">
-              <a:t>2/13/2021</a:t>
+              <a:t>20.11.2024</a:t>
             </a:fld>
             <a:endParaRPr lang="en-US" dirty="0"/>
           </a:p>
@@ -404,7 +404,7 @@
             <a:fld id="{DB01AB9E-8BFB-DA44-9869-DDFC164FA55D}" type="datetimeFigureOut">
               <a:rPr lang="en-US"/>
               <a:pPr/>
-              <a:t>2/13/2021</a:t>
+              <a:t>11/20/2024</a:t>
             </a:fld>
             <a:endParaRPr lang="en-US" dirty="0"/>
           </a:p>
@@ -6069,8 +6069,8 @@
         </p:nvSpPr>
         <p:spPr>
           <a:xfrm>
-            <a:off x="2207045" y="3391460"/>
-            <a:ext cx="3963602" cy="246221"/>
+            <a:off x="2207045" y="3243727"/>
+            <a:ext cx="3963602" cy="541687"/>
           </a:xfrm>
         </p:spPr>
         <p:txBody>
@@ -6079,6 +6079,14 @@
           </a:bodyPr>
           <a:lstStyle/>
           <a:p>
+            <a:pPr algn="ctr"/>
+            <a:r>
+              <a:rPr lang="en-US" noProof="0" dirty="0"/>
+              <a:t>Cappelen Damm</a:t>
+            </a:r>
+          </a:p>
+          <a:p>
+            <a:pPr algn="ctr"/>
             <a:r>
               <a:rPr lang="en-US" noProof="0" dirty="0"/>
               <a:t>Ramin Anvar</a:t>
@@ -6103,7 +6111,7 @@
           <a:p>
             <a:r>
               <a:rPr lang="en-US" dirty="0"/>
-              <a:t>20.02.2021</a:t>
+              <a:t>20.11.2024</a:t>
             </a:r>
           </a:p>
         </p:txBody>
@@ -6206,8 +6214,8 @@
           </a:p>
         </p:txBody>
       </p:sp>
-      <mc:AlternateContent xmlns:mc="http://schemas.openxmlformats.org/markup-compatibility/2006">
-        <mc:Choice xmlns:a14="http://schemas.microsoft.com/office/drawing/2010/main" Requires="a14">
+      <mc:AlternateContent xmlns:mc="http://schemas.openxmlformats.org/markup-compatibility/2006" xmlns:a14="http://schemas.microsoft.com/office/drawing/2010/main">
+        <mc:Choice Requires="a14">
           <p:sp>
             <p:nvSpPr>
               <p:cNvPr id="12" name="Subtitle 2">
@@ -6496,7 +6504,7 @@
             </p:txBody>
           </p:sp>
         </mc:Choice>
-        <mc:Fallback>
+        <mc:Fallback xmlns="">
           <p:sp>
             <p:nvSpPr>
               <p:cNvPr id="12" name="Subtitle 2">
@@ -6666,7 +6674,7 @@
         <p:spPr>
           <a:xfrm>
             <a:off x="880024" y="1552485"/>
-            <a:ext cx="7975218" cy="2973122"/>
+            <a:ext cx="7975218" cy="2529923"/>
           </a:xfrm>
           <a:prstGeom prst="rect">
             <a:avLst/>
@@ -6848,24 +6856,10 @@
               <a:buFont typeface="Wingdings" panose="05000000000000000000" pitchFamily="2" charset="2"/>
               <a:buChar char="Ø"/>
             </a:pPr>
-            <a:endParaRPr lang="en-US" dirty="0"/>
-          </a:p>
-          <a:p>
-            <a:pPr>
-              <a:buFont typeface="Wingdings" panose="05000000000000000000" pitchFamily="2" charset="2"/>
-              <a:buChar char="Ø"/>
-            </a:pPr>
             <a:r>
               <a:rPr lang="en-US" dirty="0"/>
               <a:t>Save the results in other formats: XML, database</a:t>
             </a:r>
-          </a:p>
-          <a:p>
-            <a:pPr>
-              <a:buFont typeface="Wingdings" panose="05000000000000000000" pitchFamily="2" charset="2"/>
-              <a:buChar char="Ø"/>
-            </a:pPr>
-            <a:endParaRPr lang="en-US" dirty="0"/>
           </a:p>
           <a:p>
             <a:pPr>
@@ -6876,6 +6870,21 @@
               <a:rPr lang="en-US" dirty="0"/>
               <a:t>Testing of GUI</a:t>
             </a:r>
+          </a:p>
+          <a:p>
+            <a:pPr>
+              <a:buFont typeface="Wingdings" panose="05000000000000000000" pitchFamily="2" charset="2"/>
+              <a:buChar char="Ø"/>
+            </a:pPr>
+            <a:r>
+              <a:rPr lang="en-US" dirty="0"/>
+              <a:t>App Conversion to </a:t>
+            </a:r>
+            <a:r>
+              <a:rPr lang="en-US" dirty="0" err="1"/>
+              <a:t>WinUI</a:t>
+            </a:r>
+            <a:endParaRPr lang="en-US" dirty="0"/>
           </a:p>
         </p:txBody>
       </p:sp>
@@ -8505,8 +8514,8 @@
           <a:chExt cx="0" cy="0"/>
         </a:xfrm>
       </p:grpSpPr>
-      <mc:AlternateContent xmlns:mc="http://schemas.openxmlformats.org/markup-compatibility/2006" xmlns:a14="http://schemas.microsoft.com/office/drawing/2010/main">
-        <mc:Choice Requires="a14">
+      <mc:AlternateContent xmlns:mc="http://schemas.openxmlformats.org/markup-compatibility/2006">
+        <mc:Choice xmlns:a14="http://schemas.microsoft.com/office/drawing/2010/main" Requires="a14">
           <p:sp>
             <p:nvSpPr>
               <p:cNvPr id="7" name="Subtitle 2">
@@ -8624,7 +8633,7 @@
                       <a:schemeClr val="bg1"/>
                     </a:solidFill>
                   </a:rPr>
-                  <a:t>Show the process development: </a:t>
+                  <a:t>Show the process progression: </a:t>
                 </a:r>
                 <a14:m>
                   <m:oMath xmlns:m="http://schemas.openxmlformats.org/officeDocument/2006/math">
@@ -8786,7 +8795,7 @@
             </p:txBody>
           </p:sp>
         </mc:Choice>
-        <mc:Fallback xmlns="">
+        <mc:Fallback>
           <p:sp>
             <p:nvSpPr>
               <p:cNvPr id="7" name="Subtitle 2">
@@ -8811,7 +8820,7 @@
               <a:blipFill>
                 <a:blip r:embed="rId3"/>
                 <a:stretch>
-                  <a:fillRect l="-2194" t="-1471" b="-3860"/>
+                  <a:fillRect l="-2194" t="-1287" b="-3860"/>
                 </a:stretch>
               </a:blipFill>
             </p:spPr>
@@ -8820,7 +8829,7 @@
               <a:lstStyle/>
               <a:p>
                 <a:r>
-                  <a:rPr lang="en-US">
+                  <a:rPr lang="nb-NO">
                     <a:noFill/>
                   </a:rPr>
                   <a:t> </a:t>
@@ -9017,7 +9026,7 @@
         <p:spPr>
           <a:xfrm>
             <a:off x="739589" y="1159475"/>
-            <a:ext cx="8191280" cy="3637919"/>
+            <a:ext cx="8191280" cy="3268587"/>
           </a:xfrm>
           <a:prstGeom prst="rect">
             <a:avLst/>
@@ -9179,7 +9188,7 @@
             </a:r>
             <a:r>
               <a:rPr lang="en-US" sz="2000" dirty="0"/>
-              <a:t> .NET 5.0, C# 8.0, WPF and MVVM</a:t>
+              <a:t> .NET 9.0, C# 13.0, WPF and MVVM</a:t>
             </a:r>
           </a:p>
           <a:p>
@@ -9197,7 +9206,7 @@
             </a:r>
             <a:r>
               <a:rPr lang="en-US" sz="2000" dirty="0"/>
-              <a:t> MS Visual Studio 2019, Community Version</a:t>
+              <a:t> MS Visual Studio 2022, Professional Version</a:t>
             </a:r>
           </a:p>
           <a:p>
@@ -9235,25 +9244,11 @@
             </a:pPr>
             <a:r>
               <a:rPr lang="en-US" i="1" dirty="0"/>
-              <a:t>Task Parallel Library </a:t>
+              <a:t>CommunityToolkit.Mvvm</a:t>
             </a:r>
             <a:r>
               <a:rPr lang="en-US" dirty="0"/>
-              <a:t>(TPL): for Asynchronous Development</a:t>
-            </a:r>
-          </a:p>
-          <a:p>
-            <a:pPr lvl="1" indent="-342900">
-              <a:buFont typeface="Wingdings" panose="05000000000000000000" pitchFamily="2" charset="2"/>
-              <a:buChar char="ü"/>
-            </a:pPr>
-            <a:r>
-              <a:rPr lang="en-US" i="1" dirty="0"/>
-              <a:t>MvvmLight</a:t>
-            </a:r>
-            <a:r>
-              <a:rPr lang="en-US" dirty="0"/>
-              <a:t>: for GUI-development with WPF og MVVM</a:t>
+              <a:t>: GUI-development &amp; MVVM</a:t>
             </a:r>
           </a:p>
           <a:p>
@@ -9291,7 +9286,7 @@
             </a:pPr>
             <a:r>
               <a:rPr lang="en-US" i="1" dirty="0"/>
-              <a:t>NUnit and NUnitTestAdapter: </a:t>
+              <a:t>xUnit: </a:t>
             </a:r>
             <a:r>
               <a:rPr lang="en-US" dirty="0"/>

</xml_diff>

<commit_message>
Added a Power Point presentation to the solution
</commit_message>
<xml_diff>
--- a/Documentation/NQueen Presentation.pptx
+++ b/Documentation/NQueen Presentation.pptx
@@ -234,7 +234,7 @@
           </a:lstStyle>
           <a:p>
             <a:fld id="{22356391-CFA0-1544-8425-9183CAE42ACA}" type="datetimeFigureOut">
-              <a:t>20.11.2024</a:t>
+              <a:t>24.11.2024</a:t>
             </a:fld>
             <a:endParaRPr lang="en-US" dirty="0"/>
           </a:p>
@@ -404,7 +404,7 @@
             <a:fld id="{DB01AB9E-8BFB-DA44-9869-DDFC164FA55D}" type="datetimeFigureOut">
               <a:rPr lang="en-US"/>
               <a:pPr/>
-              <a:t>11/20/2024</a:t>
+              <a:t>11/24/2024</a:t>
             </a:fld>
             <a:endParaRPr lang="en-US" dirty="0"/>
           </a:p>
@@ -6111,7 +6111,7 @@
           <a:p>
             <a:r>
               <a:rPr lang="en-US" dirty="0"/>
-              <a:t>20.11.2024</a:t>
+              <a:t>26.11.2024</a:t>
             </a:r>
           </a:p>
         </p:txBody>
@@ -8514,8 +8514,8 @@
           <a:chExt cx="0" cy="0"/>
         </a:xfrm>
       </p:grpSpPr>
-      <mc:AlternateContent xmlns:mc="http://schemas.openxmlformats.org/markup-compatibility/2006">
-        <mc:Choice xmlns:a14="http://schemas.microsoft.com/office/drawing/2010/main" Requires="a14">
+      <mc:AlternateContent xmlns:mc="http://schemas.openxmlformats.org/markup-compatibility/2006" xmlns:a14="http://schemas.microsoft.com/office/drawing/2010/main">
+        <mc:Choice Requires="a14">
           <p:sp>
             <p:nvSpPr>
               <p:cNvPr id="7" name="Subtitle 2">
@@ -8795,7 +8795,7 @@
             </p:txBody>
           </p:sp>
         </mc:Choice>
-        <mc:Fallback>
+        <mc:Fallback xmlns="">
           <p:sp>
             <p:nvSpPr>
               <p:cNvPr id="7" name="Subtitle 2">

</xml_diff>